<commit_message>
better sample for exception
</commit_message>
<xml_diff>
--- a/src/main/resources/Dasar-Dasar Pemograman Java.pptx
+++ b/src/main/resources/Dasar-Dasar Pemograman Java.pptx
@@ -5,7 +5,7 @@
     <p:sldMasterId id="2147483648" r:id="rId1"/>
   </p:sldMasterIdLst>
   <p:notesMasterIdLst>
-    <p:notesMasterId r:id="rId30"/>
+    <p:notesMasterId r:id="rId32"/>
   </p:notesMasterIdLst>
   <p:sldIdLst>
     <p:sldId id="256" r:id="rId2"/>
@@ -36,6 +36,8 @@
     <p:sldId id="281" r:id="rId27"/>
     <p:sldId id="282" r:id="rId28"/>
     <p:sldId id="283" r:id="rId29"/>
+    <p:sldId id="284" r:id="rId30"/>
+    <p:sldId id="285" r:id="rId31"/>
   </p:sldIdLst>
   <p:sldSz cx="9144000" cy="6858000" type="screen4x3"/>
   <p:notesSz cx="6858000" cy="9144000"/>
@@ -633,6 +635,87 @@
             <a:fld id="{55D898C7-636F-4D31-9783-AF32676114F7}" type="slidenum">
               <a:rPr lang="en-US" smtClean="0"/>
               <a:t>25</a:t>
+            </a:fld>
+            <a:endParaRPr lang="en-US"/>
+          </a:p>
+        </p:txBody>
+      </p:sp>
+    </p:spTree>
+  </p:cSld>
+  <p:clrMapOvr>
+    <a:masterClrMapping/>
+  </p:clrMapOvr>
+</p:notes>
+</file>
+
+<file path=ppt/notesSlides/notesSlide3.xml><?xml version="1.0" encoding="utf-8"?>
+<p:notes xmlns:a="http://schemas.openxmlformats.org/drawingml/2006/main" xmlns:r="http://schemas.openxmlformats.org/officeDocument/2006/relationships" xmlns:p="http://schemas.openxmlformats.org/presentationml/2006/main">
+  <p:cSld>
+    <p:spTree>
+      <p:nvGrpSpPr>
+        <p:cNvPr id="1" name=""/>
+        <p:cNvGrpSpPr/>
+        <p:nvPr/>
+      </p:nvGrpSpPr>
+      <p:grpSpPr>
+        <a:xfrm>
+          <a:off x="0" y="0"/>
+          <a:ext cx="0" cy="0"/>
+          <a:chOff x="0" y="0"/>
+          <a:chExt cx="0" cy="0"/>
+        </a:xfrm>
+      </p:grpSpPr>
+      <p:sp>
+        <p:nvSpPr>
+          <p:cNvPr id="2" name="Slide Image Placeholder 1"/>
+          <p:cNvSpPr>
+            <a:spLocks noGrp="1" noRot="1" noChangeAspect="1"/>
+          </p:cNvSpPr>
+          <p:nvPr>
+            <p:ph type="sldImg"/>
+          </p:nvPr>
+        </p:nvSpPr>
+        <p:spPr/>
+      </p:sp>
+      <p:sp>
+        <p:nvSpPr>
+          <p:cNvPr id="3" name="Notes Placeholder 2"/>
+          <p:cNvSpPr>
+            <a:spLocks noGrp="1"/>
+          </p:cNvSpPr>
+          <p:nvPr>
+            <p:ph type="body" idx="1"/>
+          </p:nvPr>
+        </p:nvSpPr>
+        <p:spPr/>
+        <p:txBody>
+          <a:bodyPr>
+            <a:normAutofit/>
+          </a:bodyPr>
+          <a:lstStyle/>
+          <a:p>
+            <a:endParaRPr lang="en-US" dirty="0"/>
+          </a:p>
+        </p:txBody>
+      </p:sp>
+      <p:sp>
+        <p:nvSpPr>
+          <p:cNvPr id="4" name="Slide Number Placeholder 3"/>
+          <p:cNvSpPr>
+            <a:spLocks noGrp="1"/>
+          </p:cNvSpPr>
+          <p:nvPr>
+            <p:ph type="sldNum" sz="quarter" idx="10"/>
+          </p:nvPr>
+        </p:nvSpPr>
+        <p:spPr/>
+        <p:txBody>
+          <a:bodyPr/>
+          <a:lstStyle/>
+          <a:p>
+            <a:fld id="{55D898C7-636F-4D31-9783-AF32676114F7}" type="slidenum">
+              <a:rPr lang="en-US" smtClean="0"/>
+              <a:t>28</a:t>
             </a:fld>
             <a:endParaRPr lang="en-US"/>
           </a:p>
@@ -6813,7 +6896,7 @@
       </p:sp>
       <p:pic>
         <p:nvPicPr>
-          <p:cNvPr id="38914" name="Picture 2"/>
+          <p:cNvPr id="38915" name="Picture 3"/>
           <p:cNvPicPr>
             <a:picLocks noChangeAspect="1" noChangeArrowheads="1"/>
           </p:cNvPicPr>
@@ -6828,8 +6911,8 @@
         </p:blipFill>
         <p:spPr bwMode="auto">
           <a:xfrm>
-            <a:off x="1547664" y="1700808"/>
-            <a:ext cx="5449054" cy="4437087"/>
+            <a:off x="1601738" y="1484784"/>
+            <a:ext cx="5940524" cy="4916793"/>
           </a:xfrm>
           <a:prstGeom prst="rect">
             <a:avLst/>
@@ -6911,7 +6994,7 @@
       </p:sp>
       <p:pic>
         <p:nvPicPr>
-          <p:cNvPr id="39939" name="Picture 3"/>
+          <p:cNvPr id="39941" name="Picture 5"/>
           <p:cNvPicPr>
             <a:picLocks noChangeAspect="1" noChangeArrowheads="1"/>
           </p:cNvPicPr>
@@ -6926,8 +7009,8 @@
         </p:blipFill>
         <p:spPr bwMode="auto">
           <a:xfrm>
-            <a:off x="399097" y="1916832"/>
-            <a:ext cx="8345806" cy="3816424"/>
+            <a:off x="823100" y="1700808"/>
+            <a:ext cx="7497800" cy="4392488"/>
           </a:xfrm>
           <a:prstGeom prst="rect">
             <a:avLst/>
@@ -6983,11 +7066,7 @@
           <a:p>
             <a:r>
               <a:rPr lang="en-US" dirty="0" smtClean="0"/>
-              <a:t>Control Flow (…</a:t>
-            </a:r>
-            <a:r>
-              <a:rPr lang="en-US" smtClean="0"/>
-              <a:t>Label Block)</a:t>
+              <a:t>Control Flow (…Label Block)</a:t>
             </a:r>
             <a:endParaRPr lang="en-US" dirty="0"/>
           </a:p>
@@ -6995,14 +7074,14 @@
       </p:sp>
       <p:pic>
         <p:nvPicPr>
-          <p:cNvPr id="40962" name="Picture 2"/>
+          <p:cNvPr id="40965" name="Picture 5"/>
           <p:cNvPicPr>
             <a:picLocks noChangeAspect="1" noChangeArrowheads="1"/>
           </p:cNvPicPr>
           <p:nvPr/>
         </p:nvPicPr>
         <p:blipFill>
-          <a:blip r:embed="rId2" cstate="print"/>
+          <a:blip r:embed="rId3" cstate="print"/>
           <a:srcRect/>
           <a:stretch>
             <a:fillRect/>
@@ -7010,8 +7089,8 @@
         </p:blipFill>
         <p:spPr bwMode="auto">
           <a:xfrm>
-            <a:off x="85725" y="2276872"/>
-            <a:ext cx="4486275" cy="3384376"/>
+            <a:off x="4572000" y="2276872"/>
+            <a:ext cx="4467225" cy="3384376"/>
           </a:xfrm>
           <a:prstGeom prst="rect">
             <a:avLst/>
@@ -7027,14 +7106,14 @@
       </p:pic>
       <p:pic>
         <p:nvPicPr>
-          <p:cNvPr id="40963" name="Picture 3"/>
+          <p:cNvPr id="40966" name="Picture 6"/>
           <p:cNvPicPr>
             <a:picLocks noChangeAspect="1" noChangeArrowheads="1"/>
           </p:cNvPicPr>
           <p:nvPr/>
         </p:nvPicPr>
         <p:blipFill>
-          <a:blip r:embed="rId3" cstate="print"/>
+          <a:blip r:embed="rId4" cstate="print"/>
           <a:srcRect/>
           <a:stretch>
             <a:fillRect/>
@@ -7042,8 +7121,8 @@
         </p:blipFill>
         <p:spPr bwMode="auto">
           <a:xfrm>
-            <a:off x="4572000" y="2204864"/>
-            <a:ext cx="4448175" cy="3456384"/>
+            <a:off x="47625" y="2276872"/>
+            <a:ext cx="4524375" cy="3384376"/>
           </a:xfrm>
           <a:prstGeom prst="rect">
             <a:avLst/>
@@ -7057,6 +7136,282 @@
           </a:ln>
         </p:spPr>
       </p:pic>
+    </p:spTree>
+  </p:cSld>
+  <p:clrMapOvr>
+    <a:masterClrMapping/>
+  </p:clrMapOvr>
+</p:sld>
+</file>
+
+<file path=ppt/slides/slide29.xml><?xml version="1.0" encoding="utf-8"?>
+<p:sld xmlns:a="http://schemas.openxmlformats.org/drawingml/2006/main" xmlns:r="http://schemas.openxmlformats.org/officeDocument/2006/relationships" xmlns:p="http://schemas.openxmlformats.org/presentationml/2006/main">
+  <p:cSld>
+    <p:spTree>
+      <p:nvGrpSpPr>
+        <p:cNvPr id="1" name=""/>
+        <p:cNvGrpSpPr/>
+        <p:nvPr/>
+      </p:nvGrpSpPr>
+      <p:grpSpPr>
+        <a:xfrm>
+          <a:off x="0" y="0"/>
+          <a:ext cx="0" cy="0"/>
+          <a:chOff x="0" y="0"/>
+          <a:chExt cx="0" cy="0"/>
+        </a:xfrm>
+      </p:grpSpPr>
+      <p:sp>
+        <p:nvSpPr>
+          <p:cNvPr id="2" name="Title 1"/>
+          <p:cNvSpPr>
+            <a:spLocks noGrp="1"/>
+          </p:cNvSpPr>
+          <p:nvPr>
+            <p:ph type="title"/>
+          </p:nvPr>
+        </p:nvSpPr>
+        <p:spPr/>
+        <p:txBody>
+          <a:bodyPr/>
+          <a:lstStyle/>
+          <a:p>
+            <a:r>
+              <a:rPr lang="en-US" dirty="0" smtClean="0"/>
+              <a:t>Control Flow (Exception Handling)</a:t>
+            </a:r>
+            <a:endParaRPr lang="en-US" dirty="0"/>
+          </a:p>
+        </p:txBody>
+      </p:sp>
+      <p:sp>
+        <p:nvSpPr>
+          <p:cNvPr id="4" name="Content Placeholder 3"/>
+          <p:cNvSpPr>
+            <a:spLocks noGrp="1"/>
+          </p:cNvSpPr>
+          <p:nvPr>
+            <p:ph idx="1"/>
+          </p:nvPr>
+        </p:nvSpPr>
+        <p:spPr/>
+        <p:txBody>
+          <a:bodyPr/>
+          <a:lstStyle/>
+          <a:p>
+            <a:r>
+              <a:rPr lang="en-US" dirty="0" smtClean="0"/>
+              <a:t>Java </a:t>
+            </a:r>
+            <a:r>
+              <a:rPr lang="en-US" dirty="0" err="1" smtClean="0"/>
+              <a:t>punya</a:t>
+            </a:r>
+            <a:r>
+              <a:rPr lang="en-US" dirty="0" smtClean="0"/>
+              <a:t> 2 </a:t>
+            </a:r>
+            <a:r>
+              <a:rPr lang="en-US" dirty="0" err="1" smtClean="0"/>
+              <a:t>jenis</a:t>
+            </a:r>
+            <a:r>
+              <a:rPr lang="en-US" dirty="0" smtClean="0"/>
+              <a:t> </a:t>
+            </a:r>
+            <a:r>
+              <a:rPr lang="en-US" dirty="0" err="1" smtClean="0"/>
+              <a:t>kesalahan</a:t>
+            </a:r>
+            <a:r>
+              <a:rPr lang="en-US" dirty="0" smtClean="0"/>
+              <a:t> (</a:t>
+            </a:r>
+            <a:r>
+              <a:rPr lang="en-US" dirty="0" err="1" smtClean="0"/>
+              <a:t>Throwable</a:t>
+            </a:r>
+            <a:r>
+              <a:rPr lang="en-US" dirty="0" smtClean="0"/>
+              <a:t> )</a:t>
+            </a:r>
+          </a:p>
+          <a:p>
+            <a:pPr lvl="1"/>
+            <a:r>
+              <a:rPr lang="en-US" dirty="0" smtClean="0"/>
+              <a:t>Error,  </a:t>
+            </a:r>
+            <a:r>
+              <a:rPr lang="en-US" dirty="0" err="1" smtClean="0"/>
+              <a:t>kesalahan</a:t>
+            </a:r>
+            <a:r>
+              <a:rPr lang="en-US" dirty="0" smtClean="0"/>
+              <a:t> fatal </a:t>
+            </a:r>
+            <a:r>
+              <a:rPr lang="en-US" dirty="0" err="1" smtClean="0"/>
+              <a:t>pada</a:t>
+            </a:r>
+            <a:r>
+              <a:rPr lang="en-US" dirty="0" smtClean="0"/>
+              <a:t> </a:t>
+            </a:r>
+            <a:r>
+              <a:rPr lang="en-US" dirty="0" err="1" smtClean="0"/>
+              <a:t>sistem</a:t>
+            </a:r>
+            <a:r>
+              <a:rPr lang="en-US" dirty="0" smtClean="0"/>
+              <a:t>, </a:t>
+            </a:r>
+            <a:r>
+              <a:rPr lang="en-US" dirty="0" err="1" smtClean="0"/>
+              <a:t>aplikasi</a:t>
+            </a:r>
+            <a:r>
+              <a:rPr lang="en-US" dirty="0" smtClean="0"/>
+              <a:t> </a:t>
+            </a:r>
+            <a:r>
+              <a:rPr lang="en-US" dirty="0" err="1" smtClean="0"/>
+              <a:t>tidak</a:t>
+            </a:r>
+            <a:r>
+              <a:rPr lang="en-US" dirty="0" smtClean="0"/>
+              <a:t> </a:t>
+            </a:r>
+            <a:r>
+              <a:rPr lang="en-US" dirty="0" err="1" smtClean="0"/>
+              <a:t>disarankan</a:t>
+            </a:r>
+            <a:r>
+              <a:rPr lang="en-US" dirty="0" smtClean="0"/>
+              <a:t> </a:t>
+            </a:r>
+            <a:r>
+              <a:rPr lang="en-US" dirty="0" err="1" smtClean="0"/>
+              <a:t>menanggulangi</a:t>
+            </a:r>
+            <a:r>
+              <a:rPr lang="en-US" dirty="0" smtClean="0"/>
+              <a:t> </a:t>
+            </a:r>
+            <a:r>
+              <a:rPr lang="en-US" dirty="0" err="1" smtClean="0"/>
+              <a:t>ini</a:t>
+            </a:r>
+            <a:r>
+              <a:rPr lang="en-US" dirty="0" smtClean="0"/>
+              <a:t>.</a:t>
+            </a:r>
+          </a:p>
+          <a:p>
+            <a:pPr lvl="1"/>
+            <a:r>
+              <a:rPr lang="en-US" dirty="0" smtClean="0"/>
+              <a:t>Exception, </a:t>
+            </a:r>
+            <a:r>
+              <a:rPr lang="en-US" dirty="0" err="1" smtClean="0"/>
+              <a:t>disarankan</a:t>
+            </a:r>
+            <a:r>
+              <a:rPr lang="en-US" dirty="0" smtClean="0"/>
+              <a:t> </a:t>
+            </a:r>
+            <a:r>
+              <a:rPr lang="en-US" dirty="0" err="1" smtClean="0"/>
+              <a:t>untuk</a:t>
+            </a:r>
+            <a:r>
+              <a:rPr lang="en-US" dirty="0" smtClean="0"/>
+              <a:t> </a:t>
+            </a:r>
+            <a:r>
+              <a:rPr lang="en-US" dirty="0" err="1" smtClean="0"/>
+              <a:t>ditanggulangi</a:t>
+            </a:r>
+            <a:r>
+              <a:rPr lang="en-US" dirty="0" smtClean="0"/>
+              <a:t> </a:t>
+            </a:r>
+            <a:r>
+              <a:rPr lang="en-US" dirty="0" err="1" smtClean="0"/>
+              <a:t>oleh</a:t>
+            </a:r>
+            <a:r>
+              <a:rPr lang="en-US" dirty="0" smtClean="0"/>
+              <a:t> </a:t>
+            </a:r>
+            <a:r>
+              <a:rPr lang="en-US" dirty="0" err="1" smtClean="0"/>
+              <a:t>aplikasi</a:t>
+            </a:r>
+            <a:r>
+              <a:rPr lang="en-US" dirty="0" smtClean="0"/>
+              <a:t>.</a:t>
+            </a:r>
+          </a:p>
+          <a:p>
+            <a:r>
+              <a:rPr lang="en-US" dirty="0" err="1" smtClean="0"/>
+              <a:t>Terdapat</a:t>
+            </a:r>
+            <a:r>
+              <a:rPr lang="en-US" dirty="0" smtClean="0"/>
+              <a:t> 2 </a:t>
+            </a:r>
+            <a:r>
+              <a:rPr lang="en-US" dirty="0" err="1" smtClean="0"/>
+              <a:t>jenis</a:t>
+            </a:r>
+            <a:r>
+              <a:rPr lang="en-US" dirty="0" smtClean="0"/>
+              <a:t> Exception </a:t>
+            </a:r>
+          </a:p>
+          <a:p>
+            <a:pPr lvl="1"/>
+            <a:r>
+              <a:rPr lang="en-US" dirty="0" smtClean="0"/>
+              <a:t>Run Time Exception (</a:t>
+            </a:r>
+            <a:r>
+              <a:rPr lang="en-US" dirty="0" err="1" smtClean="0"/>
+              <a:t>java.lang.RuntimeException</a:t>
+            </a:r>
+            <a:r>
+              <a:rPr lang="en-US" dirty="0" smtClean="0"/>
+              <a:t>) </a:t>
+            </a:r>
+          </a:p>
+          <a:p>
+            <a:pPr lvl="1"/>
+            <a:r>
+              <a:rPr lang="en-US" dirty="0" smtClean="0"/>
+              <a:t>Compile Time/Checked </a:t>
+            </a:r>
+            <a:r>
+              <a:rPr lang="en-US" dirty="0" err="1" smtClean="0"/>
+              <a:t>Excepition</a:t>
+            </a:r>
+            <a:r>
+              <a:rPr lang="en-US" dirty="0" smtClean="0"/>
+              <a:t>( non - </a:t>
+            </a:r>
+            <a:r>
+              <a:rPr lang="en-US" dirty="0" err="1" smtClean="0"/>
+              <a:t>java.lang.RuntimeException</a:t>
+            </a:r>
+            <a:r>
+              <a:rPr lang="en-US" dirty="0" smtClean="0"/>
+              <a:t>)</a:t>
+            </a:r>
+          </a:p>
+        </p:txBody>
+      </p:sp>
     </p:spTree>
   </p:cSld>
   <p:clrMapOvr>
@@ -7122,6 +7477,69 @@
           <a:lstStyle/>
           <a:p>
             <a:endParaRPr lang="en-US" dirty="0" smtClean="0"/>
+          </a:p>
+        </p:txBody>
+      </p:sp>
+    </p:spTree>
+  </p:cSld>
+  <p:clrMapOvr>
+    <a:masterClrMapping/>
+  </p:clrMapOvr>
+</p:sld>
+</file>
+
+<file path=ppt/slides/slide30.xml><?xml version="1.0" encoding="utf-8"?>
+<p:sld xmlns:a="http://schemas.openxmlformats.org/drawingml/2006/main" xmlns:r="http://schemas.openxmlformats.org/officeDocument/2006/relationships" xmlns:p="http://schemas.openxmlformats.org/presentationml/2006/main">
+  <p:cSld>
+    <p:spTree>
+      <p:nvGrpSpPr>
+        <p:cNvPr id="1" name=""/>
+        <p:cNvGrpSpPr/>
+        <p:nvPr/>
+      </p:nvGrpSpPr>
+      <p:grpSpPr>
+        <a:xfrm>
+          <a:off x="0" y="0"/>
+          <a:ext cx="0" cy="0"/>
+          <a:chOff x="0" y="0"/>
+          <a:chExt cx="0" cy="0"/>
+        </a:xfrm>
+      </p:grpSpPr>
+      <p:sp>
+        <p:nvSpPr>
+          <p:cNvPr id="2" name="Title 1"/>
+          <p:cNvSpPr>
+            <a:spLocks noGrp="1"/>
+          </p:cNvSpPr>
+          <p:nvPr>
+            <p:ph type="title"/>
+          </p:nvPr>
+        </p:nvSpPr>
+        <p:spPr/>
+        <p:txBody>
+          <a:bodyPr/>
+          <a:lstStyle/>
+          <a:p>
+            <a:endParaRPr lang="en-US" dirty="0"/>
+          </a:p>
+        </p:txBody>
+      </p:sp>
+      <p:sp>
+        <p:nvSpPr>
+          <p:cNvPr id="3" name="Content Placeholder 2"/>
+          <p:cNvSpPr>
+            <a:spLocks noGrp="1"/>
+          </p:cNvSpPr>
+          <p:nvPr>
+            <p:ph idx="1"/>
+          </p:nvPr>
+        </p:nvSpPr>
+        <p:spPr/>
+        <p:txBody>
+          <a:bodyPr/>
+          <a:lstStyle/>
+          <a:p>
+            <a:endParaRPr lang="en-US"/>
           </a:p>
         </p:txBody>
       </p:sp>

</xml_diff>